<commit_message>
put moodle quiz on slides
</commit_message>
<xml_diff>
--- a/ClassMaterials/CPU_Scheduling1/CPUScheduling.pptx
+++ b/ClassMaterials/CPU_Scheduling1/CPUScheduling.pptx
@@ -5,10 +5,10 @@
     <p:sldMasterId id="2147483672" r:id="rId1"/>
   </p:sldMasterIdLst>
   <p:notesMasterIdLst>
-    <p:notesMasterId r:id="rId16"/>
+    <p:notesMasterId r:id="rId17"/>
   </p:notesMasterIdLst>
   <p:handoutMasterIdLst>
-    <p:handoutMasterId r:id="rId17"/>
+    <p:handoutMasterId r:id="rId18"/>
   </p:handoutMasterIdLst>
   <p:sldIdLst>
     <p:sldId id="256" r:id="rId2"/>
@@ -25,6 +25,7 @@
     <p:sldId id="273" r:id="rId13"/>
     <p:sldId id="275" r:id="rId14"/>
     <p:sldId id="276" r:id="rId15"/>
+    <p:sldId id="277" r:id="rId16"/>
   </p:sldIdLst>
   <p:sldSz cx="12192000" cy="6858000"/>
   <p:notesSz cx="6858000" cy="9144000"/>
@@ -131,529 +132,6 @@
 </p:presentation>
 </file>
 
-<file path=ppt/revisionInfo.xml><?xml version="1.0" encoding="utf-8"?>
-<p1510:revInfo xmlns:a="http://schemas.openxmlformats.org/drawingml/2006/main" xmlns:r="http://schemas.openxmlformats.org/officeDocument/2006/relationships" xmlns:p1510="http://schemas.microsoft.com/office/powerpoint/2015/10/main">
-  <p1510:revLst>
-    <p1510:client id="{638A401B-617B-4C52-9B0D-82D6E3423501}" v="26" dt="2018-12-14T00:35:09.490"/>
-  </p1510:revLst>
-</p1510:revInfo>
-</file>
-
-<file path=ppt/changesInfos/changesInfo1.xml><?xml version="1.0" encoding="utf-8"?>
-<pc:chgInfo xmlns:a="http://schemas.openxmlformats.org/drawingml/2006/main" xmlns:r="http://schemas.openxmlformats.org/officeDocument/2006/relationships" xmlns:ac="http://schemas.microsoft.com/office/drawing/2013/main/command" xmlns:pc="http://schemas.microsoft.com/office/powerpoint/2013/main/command">
-  <pc:docChgLst>
-    <pc:chgData name="Song, Lixing" userId="d86a4794-d57c-4f6d-acee-3349d9d3edfc" providerId="ADAL" clId="{E6A4A57A-7BA1-4943-B287-0650F3813B88}"/>
-  </pc:docChgLst>
-  <pc:docChgLst>
-    <pc:chgData name="Song, Lixing" userId="d86a4794-d57c-4f6d-acee-3349d9d3edfc" providerId="ADAL" clId="{638A401B-617B-4C52-9B0D-82D6E3423501}"/>
-    <pc:docChg chg="undo custSel addSld delSld modSld">
-      <pc:chgData name="Song, Lixing" userId="d86a4794-d57c-4f6d-acee-3349d9d3edfc" providerId="ADAL" clId="{638A401B-617B-4C52-9B0D-82D6E3423501}" dt="2018-12-14T00:35:09.490" v="197"/>
-      <pc:docMkLst>
-        <pc:docMk/>
-      </pc:docMkLst>
-      <pc:sldChg chg="add">
-        <pc:chgData name="Song, Lixing" userId="d86a4794-d57c-4f6d-acee-3349d9d3edfc" providerId="ADAL" clId="{638A401B-617B-4C52-9B0D-82D6E3423501}" dt="2018-12-13T23:52:48.050" v="10"/>
-        <pc:sldMkLst>
-          <pc:docMk/>
-          <pc:sldMk cId="0" sldId="257"/>
-        </pc:sldMkLst>
-      </pc:sldChg>
-      <pc:sldChg chg="del">
-        <pc:chgData name="Song, Lixing" userId="d86a4794-d57c-4f6d-acee-3349d9d3edfc" providerId="ADAL" clId="{638A401B-617B-4C52-9B0D-82D6E3423501}" dt="2018-12-13T23:52:33.156" v="2" actId="2696"/>
-        <pc:sldMkLst>
-          <pc:docMk/>
-          <pc:sldMk cId="3574808687" sldId="257"/>
-        </pc:sldMkLst>
-      </pc:sldChg>
-      <pc:sldChg chg="addSp modSp add del">
-        <pc:chgData name="Song, Lixing" userId="d86a4794-d57c-4f6d-acee-3349d9d3edfc" providerId="ADAL" clId="{638A401B-617B-4C52-9B0D-82D6E3423501}" dt="2018-12-13T23:53:24.891" v="12" actId="2696"/>
-        <pc:sldMkLst>
-          <pc:docMk/>
-          <pc:sldMk cId="0" sldId="258"/>
-        </pc:sldMkLst>
-        <pc:spChg chg="add mod">
-          <ac:chgData name="Song, Lixing" userId="d86a4794-d57c-4f6d-acee-3349d9d3edfc" providerId="ADAL" clId="{638A401B-617B-4C52-9B0D-82D6E3423501}" dt="2018-12-13T23:53:06.155" v="11"/>
-          <ac:spMkLst>
-            <pc:docMk/>
-            <pc:sldMk cId="0" sldId="258"/>
-            <ac:spMk id="2" creationId="{CBF8E2AC-25EE-467A-8201-88171F1D15C3}"/>
-          </ac:spMkLst>
-        </pc:spChg>
-      </pc:sldChg>
-      <pc:sldChg chg="add">
-        <pc:chgData name="Song, Lixing" userId="d86a4794-d57c-4f6d-acee-3349d9d3edfc" providerId="ADAL" clId="{638A401B-617B-4C52-9B0D-82D6E3423501}" dt="2018-12-13T23:52:48.050" v="10"/>
-        <pc:sldMkLst>
-          <pc:docMk/>
-          <pc:sldMk cId="0" sldId="259"/>
-        </pc:sldMkLst>
-      </pc:sldChg>
-      <pc:sldChg chg="del">
-        <pc:chgData name="Song, Lixing" userId="d86a4794-d57c-4f6d-acee-3349d9d3edfc" providerId="ADAL" clId="{638A401B-617B-4C52-9B0D-82D6E3423501}" dt="2018-12-13T23:52:33.156" v="3" actId="2696"/>
-        <pc:sldMkLst>
-          <pc:docMk/>
-          <pc:sldMk cId="3955747663" sldId="259"/>
-        </pc:sldMkLst>
-      </pc:sldChg>
-      <pc:sldChg chg="add">
-        <pc:chgData name="Song, Lixing" userId="d86a4794-d57c-4f6d-acee-3349d9d3edfc" providerId="ADAL" clId="{638A401B-617B-4C52-9B0D-82D6E3423501}" dt="2018-12-13T23:52:48.050" v="10"/>
-        <pc:sldMkLst>
-          <pc:docMk/>
-          <pc:sldMk cId="0" sldId="260"/>
-        </pc:sldMkLst>
-      </pc:sldChg>
-      <pc:sldChg chg="add">
-        <pc:chgData name="Song, Lixing" userId="d86a4794-d57c-4f6d-acee-3349d9d3edfc" providerId="ADAL" clId="{638A401B-617B-4C52-9B0D-82D6E3423501}" dt="2018-12-13T23:52:48.050" v="10"/>
-        <pc:sldMkLst>
-          <pc:docMk/>
-          <pc:sldMk cId="0" sldId="261"/>
-        </pc:sldMkLst>
-      </pc:sldChg>
-      <pc:sldChg chg="add del">
-        <pc:chgData name="Song, Lixing" userId="d86a4794-d57c-4f6d-acee-3349d9d3edfc" providerId="ADAL" clId="{638A401B-617B-4C52-9B0D-82D6E3423501}" dt="2018-12-14T00:11:25.687" v="13" actId="2696"/>
-        <pc:sldMkLst>
-          <pc:docMk/>
-          <pc:sldMk cId="0" sldId="262"/>
-        </pc:sldMkLst>
-      </pc:sldChg>
-      <pc:sldChg chg="addSp modSp add del">
-        <pc:chgData name="Song, Lixing" userId="d86a4794-d57c-4f6d-acee-3349d9d3edfc" providerId="ADAL" clId="{638A401B-617B-4C52-9B0D-82D6E3423501}" dt="2018-12-14T00:11:27.101" v="14" actId="2696"/>
-        <pc:sldMkLst>
-          <pc:docMk/>
-          <pc:sldMk cId="0" sldId="263"/>
-        </pc:sldMkLst>
-        <pc:spChg chg="add mod">
-          <ac:chgData name="Song, Lixing" userId="d86a4794-d57c-4f6d-acee-3349d9d3edfc" providerId="ADAL" clId="{638A401B-617B-4C52-9B0D-82D6E3423501}" dt="2018-12-13T23:53:06.155" v="11"/>
-          <ac:spMkLst>
-            <pc:docMk/>
-            <pc:sldMk cId="0" sldId="263"/>
-            <ac:spMk id="2" creationId="{83DB0B7C-6E0B-405D-928E-C7F4A9B7DDE2}"/>
-          </ac:spMkLst>
-        </pc:spChg>
-      </pc:sldChg>
-      <pc:sldChg chg="add">
-        <pc:chgData name="Song, Lixing" userId="d86a4794-d57c-4f6d-acee-3349d9d3edfc" providerId="ADAL" clId="{638A401B-617B-4C52-9B0D-82D6E3423501}" dt="2018-12-13T23:52:48.050" v="10"/>
-        <pc:sldMkLst>
-          <pc:docMk/>
-          <pc:sldMk cId="0" sldId="264"/>
-        </pc:sldMkLst>
-      </pc:sldChg>
-      <pc:sldChg chg="del">
-        <pc:chgData name="Song, Lixing" userId="d86a4794-d57c-4f6d-acee-3349d9d3edfc" providerId="ADAL" clId="{638A401B-617B-4C52-9B0D-82D6E3423501}" dt="2018-12-13T23:52:33.156" v="4" actId="2696"/>
-        <pc:sldMkLst>
-          <pc:docMk/>
-          <pc:sldMk cId="1349991807" sldId="264"/>
-        </pc:sldMkLst>
-      </pc:sldChg>
-      <pc:sldChg chg="add del">
-        <pc:chgData name="Song, Lixing" userId="d86a4794-d57c-4f6d-acee-3349d9d3edfc" providerId="ADAL" clId="{638A401B-617B-4C52-9B0D-82D6E3423501}" dt="2018-12-14T00:15:13.295" v="15" actId="2696"/>
-        <pc:sldMkLst>
-          <pc:docMk/>
-          <pc:sldMk cId="0" sldId="265"/>
-        </pc:sldMkLst>
-      </pc:sldChg>
-      <pc:sldChg chg="del">
-        <pc:chgData name="Song, Lixing" userId="d86a4794-d57c-4f6d-acee-3349d9d3edfc" providerId="ADAL" clId="{638A401B-617B-4C52-9B0D-82D6E3423501}" dt="2018-12-13T23:52:33.171" v="5" actId="2696"/>
-        <pc:sldMkLst>
-          <pc:docMk/>
-          <pc:sldMk cId="3536556236" sldId="265"/>
-        </pc:sldMkLst>
-      </pc:sldChg>
-      <pc:sldChg chg="add modAnim">
-        <pc:chgData name="Song, Lixing" userId="d86a4794-d57c-4f6d-acee-3349d9d3edfc" providerId="ADAL" clId="{638A401B-617B-4C52-9B0D-82D6E3423501}" dt="2018-12-14T00:15:37.415" v="16"/>
-        <pc:sldMkLst>
-          <pc:docMk/>
-          <pc:sldMk cId="0" sldId="266"/>
-        </pc:sldMkLst>
-      </pc:sldChg>
-      <pc:sldChg chg="modSp add modAnim">
-        <pc:chgData name="Song, Lixing" userId="d86a4794-d57c-4f6d-acee-3349d9d3edfc" providerId="ADAL" clId="{638A401B-617B-4C52-9B0D-82D6E3423501}" dt="2018-12-14T00:17:11.596" v="26"/>
-        <pc:sldMkLst>
-          <pc:docMk/>
-          <pc:sldMk cId="0" sldId="267"/>
-        </pc:sldMkLst>
-        <pc:spChg chg="mod">
-          <ac:chgData name="Song, Lixing" userId="d86a4794-d57c-4f6d-acee-3349d9d3edfc" providerId="ADAL" clId="{638A401B-617B-4C52-9B0D-82D6E3423501}" dt="2018-12-14T00:16:52.493" v="25" actId="1076"/>
-          <ac:spMkLst>
-            <pc:docMk/>
-            <pc:sldMk cId="0" sldId="267"/>
-            <ac:spMk id="157" creationId="{00000000-0000-0000-0000-000000000000}"/>
-          </ac:spMkLst>
-        </pc:spChg>
-      </pc:sldChg>
-      <pc:sldChg chg="del">
-        <pc:chgData name="Song, Lixing" userId="d86a4794-d57c-4f6d-acee-3349d9d3edfc" providerId="ADAL" clId="{638A401B-617B-4C52-9B0D-82D6E3423501}" dt="2018-12-13T23:52:33.171" v="6" actId="2696"/>
-        <pc:sldMkLst>
-          <pc:docMk/>
-          <pc:sldMk cId="2281189512" sldId="267"/>
-        </pc:sldMkLst>
-      </pc:sldChg>
-      <pc:sldChg chg="modSp add modAnim">
-        <pc:chgData name="Song, Lixing" userId="d86a4794-d57c-4f6d-acee-3349d9d3edfc" providerId="ADAL" clId="{638A401B-617B-4C52-9B0D-82D6E3423501}" dt="2018-12-14T00:22:52.053" v="35"/>
-        <pc:sldMkLst>
-          <pc:docMk/>
-          <pc:sldMk cId="0" sldId="268"/>
-        </pc:sldMkLst>
-        <pc:spChg chg="mod">
-          <ac:chgData name="Song, Lixing" userId="d86a4794-d57c-4f6d-acee-3349d9d3edfc" providerId="ADAL" clId="{638A401B-617B-4C52-9B0D-82D6E3423501}" dt="2018-12-14T00:19:44.052" v="29" actId="20577"/>
-          <ac:spMkLst>
-            <pc:docMk/>
-            <pc:sldMk cId="0" sldId="268"/>
-            <ac:spMk id="162" creationId="{00000000-0000-0000-0000-000000000000}"/>
-          </ac:spMkLst>
-        </pc:spChg>
-      </pc:sldChg>
-      <pc:sldChg chg="modSp del">
-        <pc:chgData name="Song, Lixing" userId="d86a4794-d57c-4f6d-acee-3349d9d3edfc" providerId="ADAL" clId="{638A401B-617B-4C52-9B0D-82D6E3423501}" dt="2018-12-13T23:52:33.171" v="7" actId="2696"/>
-        <pc:sldMkLst>
-          <pc:docMk/>
-          <pc:sldMk cId="685271885" sldId="268"/>
-        </pc:sldMkLst>
-        <pc:spChg chg="mod">
-          <ac:chgData name="Song, Lixing" userId="d86a4794-d57c-4f6d-acee-3349d9d3edfc" providerId="ADAL" clId="{638A401B-617B-4C52-9B0D-82D6E3423501}" dt="2018-12-13T15:17:50.665" v="0" actId="1076"/>
-          <ac:spMkLst>
-            <pc:docMk/>
-            <pc:sldMk cId="685271885" sldId="268"/>
-            <ac:spMk id="157" creationId="{00000000-0000-0000-0000-000000000000}"/>
-          </ac:spMkLst>
-        </pc:spChg>
-      </pc:sldChg>
-      <pc:sldChg chg="modSp add modAnim">
-        <pc:chgData name="Song, Lixing" userId="d86a4794-d57c-4f6d-acee-3349d9d3edfc" providerId="ADAL" clId="{638A401B-617B-4C52-9B0D-82D6E3423501}" dt="2018-12-14T00:22:58.538" v="36"/>
-        <pc:sldMkLst>
-          <pc:docMk/>
-          <pc:sldMk cId="0" sldId="269"/>
-        </pc:sldMkLst>
-        <pc:spChg chg="mod">
-          <ac:chgData name="Song, Lixing" userId="d86a4794-d57c-4f6d-acee-3349d9d3edfc" providerId="ADAL" clId="{638A401B-617B-4C52-9B0D-82D6E3423501}" dt="2018-12-14T00:22:36.851" v="34" actId="20577"/>
-          <ac:spMkLst>
-            <pc:docMk/>
-            <pc:sldMk cId="0" sldId="269"/>
-            <ac:spMk id="172" creationId="{00000000-0000-0000-0000-000000000000}"/>
-          </ac:spMkLst>
-        </pc:spChg>
-        <pc:spChg chg="mod">
-          <ac:chgData name="Song, Lixing" userId="d86a4794-d57c-4f6d-acee-3349d9d3edfc" providerId="ADAL" clId="{638A401B-617B-4C52-9B0D-82D6E3423501}" dt="2018-12-14T00:22:30.065" v="31" actId="14100"/>
-          <ac:spMkLst>
-            <pc:docMk/>
-            <pc:sldMk cId="0" sldId="269"/>
-            <ac:spMk id="178" creationId="{00000000-0000-0000-0000-000000000000}"/>
-          </ac:spMkLst>
-        </pc:spChg>
-      </pc:sldChg>
-      <pc:sldChg chg="del">
-        <pc:chgData name="Song, Lixing" userId="d86a4794-d57c-4f6d-acee-3349d9d3edfc" providerId="ADAL" clId="{638A401B-617B-4C52-9B0D-82D6E3423501}" dt="2018-12-13T23:52:33.178" v="8" actId="2696"/>
-        <pc:sldMkLst>
-          <pc:docMk/>
-          <pc:sldMk cId="2467084581" sldId="269"/>
-        </pc:sldMkLst>
-      </pc:sldChg>
-      <pc:sldChg chg="addSp modSp add modAnim">
-        <pc:chgData name="Song, Lixing" userId="d86a4794-d57c-4f6d-acee-3349d9d3edfc" providerId="ADAL" clId="{638A401B-617B-4C52-9B0D-82D6E3423501}" dt="2018-12-14T00:33:26.059" v="195"/>
-        <pc:sldMkLst>
-          <pc:docMk/>
-          <pc:sldMk cId="0" sldId="270"/>
-        </pc:sldMkLst>
-        <pc:spChg chg="add mod">
-          <ac:chgData name="Song, Lixing" userId="d86a4794-d57c-4f6d-acee-3349d9d3edfc" providerId="ADAL" clId="{638A401B-617B-4C52-9B0D-82D6E3423501}" dt="2018-12-14T00:33:14.690" v="194" actId="1076"/>
-          <ac:spMkLst>
-            <pc:docMk/>
-            <pc:sldMk cId="0" sldId="270"/>
-            <ac:spMk id="2" creationId="{0803C0A5-5C49-47EC-ADF7-98F866E2B48A}"/>
-          </ac:spMkLst>
-        </pc:spChg>
-        <pc:spChg chg="mod">
-          <ac:chgData name="Song, Lixing" userId="d86a4794-d57c-4f6d-acee-3349d9d3edfc" providerId="ADAL" clId="{638A401B-617B-4C52-9B0D-82D6E3423501}" dt="2018-12-14T00:29:45.417" v="74" actId="20577"/>
-          <ac:spMkLst>
-            <pc:docMk/>
-            <pc:sldMk cId="0" sldId="270"/>
-            <ac:spMk id="183" creationId="{00000000-0000-0000-0000-000000000000}"/>
-          </ac:spMkLst>
-        </pc:spChg>
-      </pc:sldChg>
-      <pc:sldChg chg="addSp delSp modSp add del">
-        <pc:chgData name="Song, Lixing" userId="d86a4794-d57c-4f6d-acee-3349d9d3edfc" providerId="ADAL" clId="{638A401B-617B-4C52-9B0D-82D6E3423501}" dt="2018-12-14T00:30:36.178" v="116" actId="2696"/>
-        <pc:sldMkLst>
-          <pc:docMk/>
-          <pc:sldMk cId="0" sldId="271"/>
-        </pc:sldMkLst>
-        <pc:spChg chg="add del mod">
-          <ac:chgData name="Song, Lixing" userId="d86a4794-d57c-4f6d-acee-3349d9d3edfc" providerId="ADAL" clId="{638A401B-617B-4C52-9B0D-82D6E3423501}" dt="2018-12-14T00:30:26.987" v="115"/>
-          <ac:spMkLst>
-            <pc:docMk/>
-            <pc:sldMk cId="0" sldId="271"/>
-            <ac:spMk id="2" creationId="{16D18C04-5ADE-453A-BFC0-5172CC7C36E1}"/>
-          </ac:spMkLst>
-        </pc:spChg>
-        <pc:spChg chg="add mod">
-          <ac:chgData name="Song, Lixing" userId="d86a4794-d57c-4f6d-acee-3349d9d3edfc" providerId="ADAL" clId="{638A401B-617B-4C52-9B0D-82D6E3423501}" dt="2018-12-14T00:30:26.987" v="113" actId="478"/>
-          <ac:spMkLst>
-            <pc:docMk/>
-            <pc:sldMk cId="0" sldId="271"/>
-            <ac:spMk id="4" creationId="{5A032012-F835-4F50-A65B-F3F2AAF77088}"/>
-          </ac:spMkLst>
-        </pc:spChg>
-        <pc:spChg chg="mod">
-          <ac:chgData name="Song, Lixing" userId="d86a4794-d57c-4f6d-acee-3349d9d3edfc" providerId="ADAL" clId="{638A401B-617B-4C52-9B0D-82D6E3423501}" dt="2018-12-14T00:29:27.007" v="71" actId="20577"/>
-          <ac:spMkLst>
-            <pc:docMk/>
-            <pc:sldMk cId="0" sldId="271"/>
-            <ac:spMk id="194" creationId="{00000000-0000-0000-0000-000000000000}"/>
-          </ac:spMkLst>
-        </pc:spChg>
-        <pc:spChg chg="del mod">
-          <ac:chgData name="Song, Lixing" userId="d86a4794-d57c-4f6d-acee-3349d9d3edfc" providerId="ADAL" clId="{638A401B-617B-4C52-9B0D-82D6E3423501}" dt="2018-12-14T00:30:26.987" v="113" actId="478"/>
-          <ac:spMkLst>
-            <pc:docMk/>
-            <pc:sldMk cId="0" sldId="271"/>
-            <ac:spMk id="195" creationId="{00000000-0000-0000-0000-000000000000}"/>
-          </ac:spMkLst>
-        </pc:spChg>
-      </pc:sldChg>
-      <pc:sldChg chg="addSp modSp add del">
-        <pc:chgData name="Song, Lixing" userId="d86a4794-d57c-4f6d-acee-3349d9d3edfc" providerId="ADAL" clId="{638A401B-617B-4C52-9B0D-82D6E3423501}" dt="2018-12-14T00:26:19.931" v="43" actId="2696"/>
-        <pc:sldMkLst>
-          <pc:docMk/>
-          <pc:sldMk cId="0" sldId="272"/>
-        </pc:sldMkLst>
-        <pc:spChg chg="add mod">
-          <ac:chgData name="Song, Lixing" userId="d86a4794-d57c-4f6d-acee-3349d9d3edfc" providerId="ADAL" clId="{638A401B-617B-4C52-9B0D-82D6E3423501}" dt="2018-12-13T23:53:06.155" v="11"/>
-          <ac:spMkLst>
-            <pc:docMk/>
-            <pc:sldMk cId="0" sldId="272"/>
-            <ac:spMk id="2" creationId="{030D35BB-863E-402E-AD10-20AEE09954F8}"/>
-          </ac:spMkLst>
-        </pc:spChg>
-      </pc:sldChg>
-      <pc:sldChg chg="add">
-        <pc:chgData name="Song, Lixing" userId="d86a4794-d57c-4f6d-acee-3349d9d3edfc" providerId="ADAL" clId="{638A401B-617B-4C52-9B0D-82D6E3423501}" dt="2018-12-13T23:52:48.050" v="10"/>
-        <pc:sldMkLst>
-          <pc:docMk/>
-          <pc:sldMk cId="0" sldId="273"/>
-        </pc:sldMkLst>
-      </pc:sldChg>
-      <pc:sldChg chg="del">
-        <pc:chgData name="Song, Lixing" userId="d86a4794-d57c-4f6d-acee-3349d9d3edfc" providerId="ADAL" clId="{638A401B-617B-4C52-9B0D-82D6E3423501}" dt="2018-12-13T23:52:33.178" v="9" actId="2696"/>
-        <pc:sldMkLst>
-          <pc:docMk/>
-          <pc:sldMk cId="3632397664" sldId="273"/>
-        </pc:sldMkLst>
-      </pc:sldChg>
-      <pc:sldChg chg="add del">
-        <pc:chgData name="Song, Lixing" userId="d86a4794-d57c-4f6d-acee-3349d9d3edfc" providerId="ADAL" clId="{638A401B-617B-4C52-9B0D-82D6E3423501}" dt="2018-12-14T00:33:41.025" v="196" actId="2696"/>
-        <pc:sldMkLst>
-          <pc:docMk/>
-          <pc:sldMk cId="0" sldId="274"/>
-        </pc:sldMkLst>
-      </pc:sldChg>
-      <pc:sldChg chg="add modAnim">
-        <pc:chgData name="Song, Lixing" userId="d86a4794-d57c-4f6d-acee-3349d9d3edfc" providerId="ADAL" clId="{638A401B-617B-4C52-9B0D-82D6E3423501}" dt="2018-12-14T00:35:09.490" v="197"/>
-        <pc:sldMkLst>
-          <pc:docMk/>
-          <pc:sldMk cId="0" sldId="275"/>
-        </pc:sldMkLst>
-      </pc:sldChg>
-      <pc:sldChg chg="del">
-        <pc:chgData name="Song, Lixing" userId="d86a4794-d57c-4f6d-acee-3349d9d3edfc" providerId="ADAL" clId="{638A401B-617B-4C52-9B0D-82D6E3423501}" dt="2018-12-13T23:52:33.156" v="1" actId="2696"/>
-        <pc:sldMkLst>
-          <pc:docMk/>
-          <pc:sldMk cId="1484006416" sldId="275"/>
-        </pc:sldMkLst>
-      </pc:sldChg>
-      <pc:sldChg chg="add">
-        <pc:chgData name="Song, Lixing" userId="d86a4794-d57c-4f6d-acee-3349d9d3edfc" providerId="ADAL" clId="{638A401B-617B-4C52-9B0D-82D6E3423501}" dt="2018-12-13T23:52:48.050" v="10"/>
-        <pc:sldMkLst>
-          <pc:docMk/>
-          <pc:sldMk cId="0" sldId="276"/>
-        </pc:sldMkLst>
-      </pc:sldChg>
-      <pc:sldChg chg="modSp add del">
-        <pc:chgData name="Song, Lixing" userId="d86a4794-d57c-4f6d-acee-3349d9d3edfc" providerId="ADAL" clId="{638A401B-617B-4C52-9B0D-82D6E3423501}" dt="2018-12-14T00:31:46.772" v="180" actId="2696"/>
-        <pc:sldMkLst>
-          <pc:docMk/>
-          <pc:sldMk cId="1316062867" sldId="277"/>
-        </pc:sldMkLst>
-        <pc:spChg chg="mod">
-          <ac:chgData name="Song, Lixing" userId="d86a4794-d57c-4f6d-acee-3349d9d3edfc" providerId="ADAL" clId="{638A401B-617B-4C52-9B0D-82D6E3423501}" dt="2018-12-14T00:30:54.462" v="131" actId="20577"/>
-          <ac:spMkLst>
-            <pc:docMk/>
-            <pc:sldMk cId="1316062867" sldId="277"/>
-            <ac:spMk id="2" creationId="{ECFAD44F-73A1-4A61-959B-370C974D40DE}"/>
-          </ac:spMkLst>
-        </pc:spChg>
-        <pc:spChg chg="mod">
-          <ac:chgData name="Song, Lixing" userId="d86a4794-d57c-4f6d-acee-3349d9d3edfc" providerId="ADAL" clId="{638A401B-617B-4C52-9B0D-82D6E3423501}" dt="2018-12-14T00:31:43.946" v="179"/>
-          <ac:spMkLst>
-            <pc:docMk/>
-            <pc:sldMk cId="1316062867" sldId="277"/>
-            <ac:spMk id="3" creationId="{153CE03E-EE83-4E41-B22F-E15D41A797FA}"/>
-          </ac:spMkLst>
-        </pc:spChg>
-      </pc:sldChg>
-      <pc:sldChg chg="modSp add del">
-        <pc:chgData name="Song, Lixing" userId="d86a4794-d57c-4f6d-acee-3349d9d3edfc" providerId="ADAL" clId="{638A401B-617B-4C52-9B0D-82D6E3423501}" dt="2018-12-14T00:29:12.929" v="67" actId="2696"/>
-        <pc:sldMkLst>
-          <pc:docMk/>
-          <pc:sldMk cId="2115881227" sldId="277"/>
-        </pc:sldMkLst>
-        <pc:spChg chg="mod">
-          <ac:chgData name="Song, Lixing" userId="d86a4794-d57c-4f6d-acee-3349d9d3edfc" providerId="ADAL" clId="{638A401B-617B-4C52-9B0D-82D6E3423501}" dt="2018-12-14T00:28:01.021" v="65" actId="20577"/>
-          <ac:spMkLst>
-            <pc:docMk/>
-            <pc:sldMk cId="2115881227" sldId="277"/>
-            <ac:spMk id="2" creationId="{3B8DCE24-50D7-4438-91DC-0872DFCFB2C3}"/>
-          </ac:spMkLst>
-        </pc:spChg>
-      </pc:sldChg>
-    </pc:docChg>
-  </pc:docChgLst>
-  <pc:docChgLst>
-    <pc:chgData name="Song, Lixing" userId="d86a4794-d57c-4f6d-acee-3349d9d3edfc" providerId="ADAL" clId="{57BE710F-CAAC-5C4C-B1E2-33D10347FAC9}"/>
-  </pc:docChgLst>
-  <pc:docChgLst>
-    <pc:chgData name="Song, Lixing" userId="d86a4794-d57c-4f6d-acee-3349d9d3edfc" providerId="ADAL" clId="{6256184C-17FA-4944-87C5-3041B62521D9}"/>
-  </pc:docChgLst>
-  <pc:docChgLst>
-    <pc:chgData name="Song, Lixing" userId="d86a4794-d57c-4f6d-acee-3349d9d3edfc" providerId="ADAL" clId="{DE4E7ECB-2978-1244-B374-6C6C0AE9F7D6}"/>
-  </pc:docChgLst>
-  <pc:docChgLst>
-    <pc:chgData name="Song, Lixing" userId="d86a4794-d57c-4f6d-acee-3349d9d3edfc" providerId="ADAL" clId="{3DB7AE05-0F07-FE4F-998C-F915C7572059}"/>
-  </pc:docChgLst>
-  <pc:docChgLst>
-    <pc:chgData name="Song, Lixing" userId="d86a4794-d57c-4f6d-acee-3349d9d3edfc" providerId="ADAL" clId="{9E87C597-9CCC-9D40-AF98-FA57E59EE777}"/>
-    <pc:docChg chg="modSld">
-      <pc:chgData name="Song, Lixing" userId="d86a4794-d57c-4f6d-acee-3349d9d3edfc" providerId="ADAL" clId="{9E87C597-9CCC-9D40-AF98-FA57E59EE777}" dt="2018-09-26T18:24:13.941" v="21" actId="20577"/>
-      <pc:docMkLst>
-        <pc:docMk/>
-      </pc:docMkLst>
-    </pc:docChg>
-  </pc:docChgLst>
-  <pc:docChgLst>
-    <pc:chgData name="Song, Lixing" userId="d86a4794-d57c-4f6d-acee-3349d9d3edfc" providerId="ADAL" clId="{63E5B0BA-7CA7-664C-A874-0CD1DDB96575}"/>
-  </pc:docChgLst>
-  <pc:docChgLst>
-    <pc:chgData name="Song, Lixing" userId="d86a4794-d57c-4f6d-acee-3349d9d3edfc" providerId="ADAL" clId="{5E3F1545-9865-4D0C-9B6A-C53785E4F7ED}"/>
-    <pc:docChg chg="custSel addSld delSld modSld">
-      <pc:chgData name="Song, Lixing" userId="d86a4794-d57c-4f6d-acee-3349d9d3edfc" providerId="ADAL" clId="{5E3F1545-9865-4D0C-9B6A-C53785E4F7ED}" dt="2018-09-17T15:05:39.670" v="78"/>
-      <pc:docMkLst>
-        <pc:docMk/>
-      </pc:docMkLst>
-      <pc:sldChg chg="modSp">
-        <pc:chgData name="Song, Lixing" userId="d86a4794-d57c-4f6d-acee-3349d9d3edfc" providerId="ADAL" clId="{5E3F1545-9865-4D0C-9B6A-C53785E4F7ED}" dt="2018-09-17T15:04:11.106" v="25" actId="20577"/>
-        <pc:sldMkLst>
-          <pc:docMk/>
-          <pc:sldMk cId="25011158" sldId="256"/>
-        </pc:sldMkLst>
-        <pc:spChg chg="mod">
-          <ac:chgData name="Song, Lixing" userId="d86a4794-d57c-4f6d-acee-3349d9d3edfc" providerId="ADAL" clId="{5E3F1545-9865-4D0C-9B6A-C53785E4F7ED}" dt="2018-09-17T15:04:11.106" v="25" actId="20577"/>
-          <ac:spMkLst>
-            <pc:docMk/>
-            <pc:sldMk cId="25011158" sldId="256"/>
-            <ac:spMk id="2" creationId="{6DDA001A-43E3-1449-893B-948F2BFF68B6}"/>
-          </ac:spMkLst>
-        </pc:spChg>
-      </pc:sldChg>
-    </pc:docChg>
-  </pc:docChgLst>
-  <pc:docChgLst>
-    <pc:chgData name="Song, Lixing" userId="d86a4794-d57c-4f6d-acee-3349d9d3edfc" providerId="ADAL" clId="{C22CFC7D-4CFF-3949-BBCC-B4ADD21FB069}"/>
-  </pc:docChgLst>
-  <pc:docChgLst>
-    <pc:chgData name="Song, Lixing" userId="d86a4794-d57c-4f6d-acee-3349d9d3edfc" providerId="ADAL" clId="{560DAE8F-EC11-0B4B-88CC-7E2C494E737F}"/>
-    <pc:docChg chg="undo redo custSel addSld delSld modSld sldOrd modMainMaster">
-      <pc:chgData name="Song, Lixing" userId="d86a4794-d57c-4f6d-acee-3349d9d3edfc" providerId="ADAL" clId="{560DAE8F-EC11-0B4B-88CC-7E2C494E737F}" dt="2018-09-19T17:12:10.784" v="317" actId="1076"/>
-      <pc:docMkLst>
-        <pc:docMk/>
-      </pc:docMkLst>
-      <pc:sldMasterChg chg="modSldLayout">
-        <pc:chgData name="Song, Lixing" userId="d86a4794-d57c-4f6d-acee-3349d9d3edfc" providerId="ADAL" clId="{560DAE8F-EC11-0B4B-88CC-7E2C494E737F}" dt="2018-09-17T15:23:41.281" v="2"/>
-        <pc:sldMasterMkLst>
-          <pc:docMk/>
-          <pc:sldMasterMk cId="949477102" sldId="2147483672"/>
-        </pc:sldMasterMkLst>
-        <pc:sldLayoutChg chg="addSp">
-          <pc:chgData name="Song, Lixing" userId="d86a4794-d57c-4f6d-acee-3349d9d3edfc" providerId="ADAL" clId="{560DAE8F-EC11-0B4B-88CC-7E2C494E737F}" dt="2018-09-17T15:23:41.281" v="2"/>
-          <pc:sldLayoutMkLst>
-            <pc:docMk/>
-            <pc:sldMasterMk cId="949477102" sldId="2147483672"/>
-            <pc:sldLayoutMk cId="3698689470" sldId="2147483673"/>
-          </pc:sldLayoutMkLst>
-          <pc:spChg chg="add">
-            <ac:chgData name="Song, Lixing" userId="d86a4794-d57c-4f6d-acee-3349d9d3edfc" providerId="ADAL" clId="{560DAE8F-EC11-0B4B-88CC-7E2C494E737F}" dt="2018-09-17T15:23:41.281" v="2"/>
-            <ac:spMkLst>
-              <pc:docMk/>
-              <pc:sldMasterMk cId="949477102" sldId="2147483672"/>
-              <pc:sldLayoutMk cId="3698689470" sldId="2147483673"/>
-              <ac:spMk id="9" creationId="{47D94E8C-78C1-7D4E-B6E5-DE7547A8E49B}"/>
-            </ac:spMkLst>
-          </pc:spChg>
-          <pc:picChg chg="add">
-            <ac:chgData name="Song, Lixing" userId="d86a4794-d57c-4f6d-acee-3349d9d3edfc" providerId="ADAL" clId="{560DAE8F-EC11-0B4B-88CC-7E2C494E737F}" dt="2018-09-17T15:23:41.281" v="2"/>
-            <ac:picMkLst>
-              <pc:docMk/>
-              <pc:sldMasterMk cId="949477102" sldId="2147483672"/>
-              <pc:sldLayoutMk cId="3698689470" sldId="2147483673"/>
-              <ac:picMk id="10" creationId="{F8D99126-6C23-A143-AED3-2FECD7895C68}"/>
-            </ac:picMkLst>
-          </pc:picChg>
-        </pc:sldLayoutChg>
-        <pc:sldLayoutChg chg="addSp">
-          <pc:chgData name="Song, Lixing" userId="d86a4794-d57c-4f6d-acee-3349d9d3edfc" providerId="ADAL" clId="{560DAE8F-EC11-0B4B-88CC-7E2C494E737F}" dt="2018-09-17T15:23:41.281" v="2"/>
-          <pc:sldLayoutMkLst>
-            <pc:docMk/>
-            <pc:sldMasterMk cId="949477102" sldId="2147483672"/>
-            <pc:sldLayoutMk cId="410718566" sldId="2147483674"/>
-          </pc:sldLayoutMkLst>
-          <pc:spChg chg="add">
-            <ac:chgData name="Song, Lixing" userId="d86a4794-d57c-4f6d-acee-3349d9d3edfc" providerId="ADAL" clId="{560DAE8F-EC11-0B4B-88CC-7E2C494E737F}" dt="2018-09-17T15:23:41.281" v="2"/>
-            <ac:spMkLst>
-              <pc:docMk/>
-              <pc:sldMasterMk cId="949477102" sldId="2147483672"/>
-              <pc:sldLayoutMk cId="410718566" sldId="2147483674"/>
-              <ac:spMk id="8" creationId="{AA0FB82A-D375-B84C-8D2D-81B6F63E387B}"/>
-            </ac:spMkLst>
-          </pc:spChg>
-        </pc:sldLayoutChg>
-      </pc:sldMasterChg>
-    </pc:docChg>
-  </pc:docChgLst>
-  <pc:docChgLst>
-    <pc:chgData name="Song, Lixing" userId="d86a4794-d57c-4f6d-acee-3349d9d3edfc" providerId="ADAL" clId="{41CAD8FE-0633-0C44-91B6-9FBD914D6317}"/>
-  </pc:docChgLst>
-  <pc:docChgLst>
-    <pc:chgData name="Song, Lixing" userId="d86a4794-d57c-4f6d-acee-3349d9d3edfc" providerId="ADAL" clId="{5D69B093-118D-1741-8919-161214198A6C}"/>
-    <pc:docChg chg="undo custSel addSld delSld modSld">
-      <pc:chgData name="Song, Lixing" userId="d86a4794-d57c-4f6d-acee-3349d9d3edfc" providerId="ADAL" clId="{5D69B093-118D-1741-8919-161214198A6C}" dt="2018-10-08T14:52:20.870" v="255" actId="2696"/>
-      <pc:docMkLst>
-        <pc:docMk/>
-      </pc:docMkLst>
-      <pc:sldChg chg="addSp modSp">
-        <pc:chgData name="Song, Lixing" userId="d86a4794-d57c-4f6d-acee-3349d9d3edfc" providerId="ADAL" clId="{5D69B093-118D-1741-8919-161214198A6C}" dt="2018-10-08T14:41:12.478" v="228" actId="1076"/>
-        <pc:sldMkLst>
-          <pc:docMk/>
-          <pc:sldMk cId="25011158" sldId="256"/>
-        </pc:sldMkLst>
-        <pc:spChg chg="mod">
-          <ac:chgData name="Song, Lixing" userId="d86a4794-d57c-4f6d-acee-3349d9d3edfc" providerId="ADAL" clId="{5D69B093-118D-1741-8919-161214198A6C}" dt="2018-10-01T13:59:23.193" v="17" actId="20577"/>
-          <ac:spMkLst>
-            <pc:docMk/>
-            <pc:sldMk cId="25011158" sldId="256"/>
-            <ac:spMk id="2" creationId="{6DDA001A-43E3-1449-893B-948F2BFF68B6}"/>
-          </ac:spMkLst>
-        </pc:spChg>
-        <pc:spChg chg="add mod">
-          <ac:chgData name="Song, Lixing" userId="d86a4794-d57c-4f6d-acee-3349d9d3edfc" providerId="ADAL" clId="{5D69B093-118D-1741-8919-161214198A6C}" dt="2018-10-08T14:41:12.478" v="228" actId="1076"/>
-          <ac:spMkLst>
-            <pc:docMk/>
-            <pc:sldMk cId="25011158" sldId="256"/>
-            <ac:spMk id="4" creationId="{274FCC87-5C4D-5848-8347-13F19BA1FA30}"/>
-          </ac:spMkLst>
-        </pc:spChg>
-      </pc:sldChg>
-    </pc:docChg>
-  </pc:docChgLst>
-</pc:chgInfo>
-</file>
-
 <file path=ppt/handoutMasters/handoutMaster1.xml><?xml version="1.0" encoding="utf-8"?>
 <p:handoutMaster xmlns:a="http://schemas.openxmlformats.org/drawingml/2006/main" xmlns:r="http://schemas.openxmlformats.org/officeDocument/2006/relationships" xmlns:p="http://schemas.openxmlformats.org/presentationml/2006/main">
   <p:cSld>
@@ -748,7 +226,7 @@
           <a:p>
             <a:fld id="{B2F99CBE-2880-364F-A223-8E393E38EFAB}" type="datetimeFigureOut">
               <a:rPr lang="en-US" smtClean="0"/>
-              <a:t>12/13/2018</a:t>
+              <a:t>3/21/2019</a:t>
             </a:fld>
             <a:endParaRPr lang="en-US"/>
           </a:p>
@@ -925,7 +403,7 @@
           <a:p>
             <a:fld id="{8D9AE51D-F948-044F-B984-1DA50063DADE}" type="datetimeFigureOut">
               <a:rPr lang="en-US" smtClean="0"/>
-              <a:t>12/13/2018</a:t>
+              <a:t>3/21/2019</a:t>
             </a:fld>
             <a:endParaRPr lang="en-US"/>
           </a:p>
@@ -2775,7 +2253,7 @@
           <a:p>
             <a:fld id="{82A73E24-5133-184A-B08C-013331FC8007}" type="datetimeFigureOut">
               <a:rPr lang="en-US" smtClean="0"/>
-              <a:t>12/13/2018</a:t>
+              <a:t>3/21/2019</a:t>
             </a:fld>
             <a:endParaRPr lang="en-US"/>
           </a:p>
@@ -3137,7 +2615,7 @@
           <a:p>
             <a:fld id="{82A73E24-5133-184A-B08C-013331FC8007}" type="datetimeFigureOut">
               <a:rPr lang="en-US" smtClean="0"/>
-              <a:t>12/13/2018</a:t>
+              <a:t>3/21/2019</a:t>
             </a:fld>
             <a:endParaRPr lang="en-US"/>
           </a:p>
@@ -3345,7 +2823,7 @@
           <a:p>
             <a:fld id="{82A73E24-5133-184A-B08C-013331FC8007}" type="datetimeFigureOut">
               <a:rPr lang="en-US" smtClean="0"/>
-              <a:t>12/13/2018</a:t>
+              <a:t>3/21/2019</a:t>
             </a:fld>
             <a:endParaRPr lang="en-US"/>
           </a:p>
@@ -4423,7 +3901,7 @@
           <a:p>
             <a:fld id="{82A73E24-5133-184A-B08C-013331FC8007}" type="datetimeFigureOut">
               <a:rPr lang="en-US" smtClean="0"/>
-              <a:t>12/13/2018</a:t>
+              <a:t>3/21/2019</a:t>
             </a:fld>
             <a:endParaRPr lang="en-US"/>
           </a:p>
@@ -4777,7 +4255,7 @@
           <a:p>
             <a:fld id="{82A73E24-5133-184A-B08C-013331FC8007}" type="datetimeFigureOut">
               <a:rPr lang="en-US" smtClean="0"/>
-              <a:t>12/13/2018</a:t>
+              <a:t>3/21/2019</a:t>
             </a:fld>
             <a:endParaRPr lang="en-US"/>
           </a:p>
@@ -5042,7 +4520,7 @@
           <a:p>
             <a:fld id="{82A73E24-5133-184A-B08C-013331FC8007}" type="datetimeFigureOut">
               <a:rPr lang="en-US" smtClean="0"/>
-              <a:t>12/13/2018</a:t>
+              <a:t>3/21/2019</a:t>
             </a:fld>
             <a:endParaRPr lang="en-US"/>
           </a:p>
@@ -5454,7 +4932,7 @@
           <a:p>
             <a:fld id="{82A73E24-5133-184A-B08C-013331FC8007}" type="datetimeFigureOut">
               <a:rPr lang="en-US" smtClean="0"/>
-              <a:t>12/13/2018</a:t>
+              <a:t>3/21/2019</a:t>
             </a:fld>
             <a:endParaRPr lang="en-US"/>
           </a:p>
@@ -5595,7 +5073,7 @@
           <a:p>
             <a:fld id="{82A73E24-5133-184A-B08C-013331FC8007}" type="datetimeFigureOut">
               <a:rPr lang="en-US" smtClean="0"/>
-              <a:t>12/13/2018</a:t>
+              <a:t>3/21/2019</a:t>
             </a:fld>
             <a:endParaRPr lang="en-US"/>
           </a:p>
@@ -5708,7 +5186,7 @@
           <a:p>
             <a:fld id="{82A73E24-5133-184A-B08C-013331FC8007}" type="datetimeFigureOut">
               <a:rPr lang="en-US" smtClean="0"/>
-              <a:t>12/13/2018</a:t>
+              <a:t>3/21/2019</a:t>
             </a:fld>
             <a:endParaRPr lang="en-US"/>
           </a:p>
@@ -6019,7 +5497,7 @@
           <a:p>
             <a:fld id="{82A73E24-5133-184A-B08C-013331FC8007}" type="datetimeFigureOut">
               <a:rPr lang="en-US" smtClean="0"/>
-              <a:t>12/13/2018</a:t>
+              <a:t>3/21/2019</a:t>
             </a:fld>
             <a:endParaRPr lang="en-US"/>
           </a:p>
@@ -6310,7 +5788,7 @@
           <a:p>
             <a:fld id="{82A73E24-5133-184A-B08C-013331FC8007}" type="datetimeFigureOut">
               <a:rPr lang="en-US" smtClean="0"/>
-              <a:t>12/13/2018</a:t>
+              <a:t>3/21/2019</a:t>
             </a:fld>
             <a:endParaRPr lang="en-US"/>
           </a:p>
@@ -6551,7 +6029,7 @@
           <a:p>
             <a:fld id="{82A73E24-5133-184A-B08C-013331FC8007}" type="datetimeFigureOut">
               <a:rPr lang="en-US" smtClean="0"/>
-              <a:t>12/13/2018</a:t>
+              <a:t>3/21/2019</a:t>
             </a:fld>
             <a:endParaRPr lang="en-US"/>
           </a:p>
@@ -7035,7 +6513,7 @@
           <a:p>
             <a:fld id="{B7B09853-F130-A44D-A7BC-226D14CA7C56}" type="datetime2">
               <a:rPr lang="en-US" smtClean="0"/>
-              <a:t>Thursday, December 13, 2018</a:t>
+              <a:t>Thursday, March 21, 2019</a:t>
             </a:fld>
             <a:endParaRPr lang="en-US" dirty="0"/>
           </a:p>
@@ -10213,6 +9691,107 @@
         </p:txBody>
       </p:sp>
     </p:spTree>
+  </p:cSld>
+  <p:clrMapOvr>
+    <a:masterClrMapping/>
+  </p:clrMapOvr>
+</p:sld>
+</file>
+
+<file path=ppt/slides/slide15.xml><?xml version="1.0" encoding="utf-8"?>
+<p:sld xmlns:a="http://schemas.openxmlformats.org/drawingml/2006/main" xmlns:r="http://schemas.openxmlformats.org/officeDocument/2006/relationships" xmlns:p="http://schemas.openxmlformats.org/presentationml/2006/main">
+  <p:cSld>
+    <p:spTree>
+      <p:nvGrpSpPr>
+        <p:cNvPr id="1" name=""/>
+        <p:cNvGrpSpPr/>
+        <p:nvPr/>
+      </p:nvGrpSpPr>
+      <p:grpSpPr>
+        <a:xfrm>
+          <a:off x="0" y="0"/>
+          <a:ext cx="0" cy="0"/>
+          <a:chOff x="0" y="0"/>
+          <a:chExt cx="0" cy="0"/>
+        </a:xfrm>
+      </p:grpSpPr>
+      <p:sp>
+        <p:nvSpPr>
+          <p:cNvPr id="2" name="Title 1">
+            <a:extLst>
+              <a:ext uri="{FF2B5EF4-FFF2-40B4-BE49-F238E27FC236}">
+                <a16:creationId xmlns:a16="http://schemas.microsoft.com/office/drawing/2014/main" id="{5A37376E-5DD2-4B28-877A-04AB35B66E78}"/>
+              </a:ext>
+            </a:extLst>
+          </p:cNvPr>
+          <p:cNvSpPr>
+            <a:spLocks noGrp="1"/>
+          </p:cNvSpPr>
+          <p:nvPr>
+            <p:ph type="title"/>
+          </p:nvPr>
+        </p:nvSpPr>
+        <p:spPr/>
+        <p:txBody>
+          <a:bodyPr/>
+          <a:lstStyle/>
+          <a:p>
+            <a:r>
+              <a:rPr lang="en-US" dirty="0">
+                <a:cs typeface="Calibri Light"/>
+              </a:rPr>
+              <a:t>Moodle Quiz</a:t>
+            </a:r>
+            <a:endParaRPr lang="en-US" dirty="0"/>
+          </a:p>
+        </p:txBody>
+      </p:sp>
+      <p:sp>
+        <p:nvSpPr>
+          <p:cNvPr id="3" name="Content Placeholder 2">
+            <a:extLst>
+              <a:ext uri="{FF2B5EF4-FFF2-40B4-BE49-F238E27FC236}">
+                <a16:creationId xmlns:a16="http://schemas.microsoft.com/office/drawing/2014/main" id="{9F666B71-1128-421A-9EF6-0D9E53DA9173}"/>
+              </a:ext>
+            </a:extLst>
+          </p:cNvPr>
+          <p:cNvSpPr>
+            <a:spLocks noGrp="1"/>
+          </p:cNvSpPr>
+          <p:nvPr>
+            <p:ph idx="1"/>
+          </p:nvPr>
+        </p:nvSpPr>
+        <p:spPr/>
+        <p:txBody>
+          <a:bodyPr vert="horz" lIns="91440" tIns="45720" rIns="91440" bIns="45720" rtlCol="0" anchor="t">
+            <a:normAutofit/>
+          </a:bodyPr>
+          <a:lstStyle/>
+          <a:p>
+            <a:r>
+              <a:rPr lang="en-US" dirty="0">
+                <a:cs typeface="Calibri"/>
+              </a:rPr>
+              <a:t>Look for "Scheduling 1 in class" on Moodle</a:t>
+            </a:r>
+          </a:p>
+          <a:p>
+            <a:r>
+              <a:rPr lang="en-US" dirty="0">
+                <a:cs typeface="Calibri"/>
+              </a:rPr>
+              <a:t>You have unlimited tries</a:t>
+            </a:r>
+          </a:p>
+        </p:txBody>
+      </p:sp>
+    </p:spTree>
+    <p:extLst>
+      <p:ext uri="{BB962C8B-B14F-4D97-AF65-F5344CB8AC3E}">
+        <p14:creationId xmlns:p14="http://schemas.microsoft.com/office/powerpoint/2010/main" val="36694532"/>
+      </p:ext>
+    </p:extLst>
   </p:cSld>
   <p:clrMapOvr>
     <a:masterClrMapping/>

</xml_diff>